<commit_message>
change the template figure
</commit_message>
<xml_diff>
--- a/docs/slides/images/stats_reporting_format.pptx
+++ b/docs/slides/images/stats_reporting_format.pptx
@@ -259,7 +259,7 @@
           <a:p>
             <a:fld id="{3A568ECA-0F19-475D-8A7D-8DD2C3FEE73B}" type="datetimeFigureOut">
               <a:rPr lang="en-US" smtClean="0"/>
-              <a:t>12/15/20</a:t>
+              <a:t>3/1/21</a:t>
             </a:fld>
             <a:endParaRPr lang="en-US"/>
           </a:p>
@@ -457,7 +457,7 @@
           <a:p>
             <a:fld id="{3A568ECA-0F19-475D-8A7D-8DD2C3FEE73B}" type="datetimeFigureOut">
               <a:rPr lang="en-US" smtClean="0"/>
-              <a:t>12/15/20</a:t>
+              <a:t>3/1/21</a:t>
             </a:fld>
             <a:endParaRPr lang="en-US"/>
           </a:p>
@@ -665,7 +665,7 @@
           <a:p>
             <a:fld id="{3A568ECA-0F19-475D-8A7D-8DD2C3FEE73B}" type="datetimeFigureOut">
               <a:rPr lang="en-US" smtClean="0"/>
-              <a:t>12/15/20</a:t>
+              <a:t>3/1/21</a:t>
             </a:fld>
             <a:endParaRPr lang="en-US"/>
           </a:p>
@@ -863,7 +863,7 @@
           <a:p>
             <a:fld id="{3A568ECA-0F19-475D-8A7D-8DD2C3FEE73B}" type="datetimeFigureOut">
               <a:rPr lang="en-US" smtClean="0"/>
-              <a:t>12/15/20</a:t>
+              <a:t>3/1/21</a:t>
             </a:fld>
             <a:endParaRPr lang="en-US"/>
           </a:p>
@@ -1138,7 +1138,7 @@
           <a:p>
             <a:fld id="{3A568ECA-0F19-475D-8A7D-8DD2C3FEE73B}" type="datetimeFigureOut">
               <a:rPr lang="en-US" smtClean="0"/>
-              <a:t>12/15/20</a:t>
+              <a:t>3/1/21</a:t>
             </a:fld>
             <a:endParaRPr lang="en-US"/>
           </a:p>
@@ -1403,7 +1403,7 @@
           <a:p>
             <a:fld id="{3A568ECA-0F19-475D-8A7D-8DD2C3FEE73B}" type="datetimeFigureOut">
               <a:rPr lang="en-US" smtClean="0"/>
-              <a:t>12/15/20</a:t>
+              <a:t>3/1/21</a:t>
             </a:fld>
             <a:endParaRPr lang="en-US"/>
           </a:p>
@@ -1815,7 +1815,7 @@
           <a:p>
             <a:fld id="{3A568ECA-0F19-475D-8A7D-8DD2C3FEE73B}" type="datetimeFigureOut">
               <a:rPr lang="en-US" smtClean="0"/>
-              <a:t>12/15/20</a:t>
+              <a:t>3/1/21</a:t>
             </a:fld>
             <a:endParaRPr lang="en-US"/>
           </a:p>
@@ -1956,7 +1956,7 @@
           <a:p>
             <a:fld id="{3A568ECA-0F19-475D-8A7D-8DD2C3FEE73B}" type="datetimeFigureOut">
               <a:rPr lang="en-US" smtClean="0"/>
-              <a:t>12/15/20</a:t>
+              <a:t>3/1/21</a:t>
             </a:fld>
             <a:endParaRPr lang="en-US"/>
           </a:p>
@@ -2069,7 +2069,7 @@
           <a:p>
             <a:fld id="{3A568ECA-0F19-475D-8A7D-8DD2C3FEE73B}" type="datetimeFigureOut">
               <a:rPr lang="en-US" smtClean="0"/>
-              <a:t>12/15/20</a:t>
+              <a:t>3/1/21</a:t>
             </a:fld>
             <a:endParaRPr lang="en-US"/>
           </a:p>
@@ -2380,7 +2380,7 @@
           <a:p>
             <a:fld id="{3A568ECA-0F19-475D-8A7D-8DD2C3FEE73B}" type="datetimeFigureOut">
               <a:rPr lang="en-US" smtClean="0"/>
-              <a:t>12/15/20</a:t>
+              <a:t>3/1/21</a:t>
             </a:fld>
             <a:endParaRPr lang="en-US"/>
           </a:p>
@@ -2668,7 +2668,7 @@
           <a:p>
             <a:fld id="{3A568ECA-0F19-475D-8A7D-8DD2C3FEE73B}" type="datetimeFigureOut">
               <a:rPr lang="en-US" smtClean="0"/>
-              <a:t>12/15/20</a:t>
+              <a:t>3/1/21</a:t>
             </a:fld>
             <a:endParaRPr lang="en-US"/>
           </a:p>
@@ -2909,7 +2909,7 @@
           <a:p>
             <a:fld id="{3A568ECA-0F19-475D-8A7D-8DD2C3FEE73B}" type="datetimeFigureOut">
               <a:rPr lang="en-US" smtClean="0"/>
-              <a:t>12/15/20</a:t>
+              <a:t>3/1/21</a:t>
             </a:fld>
             <a:endParaRPr lang="en-US"/>
           </a:p>
@@ -3326,8 +3326,8 @@
           <a:chExt cx="0" cy="0"/>
         </a:xfrm>
       </p:grpSpPr>
-      <mc:AlternateContent xmlns:mc="http://schemas.openxmlformats.org/markup-compatibility/2006">
-        <mc:Choice xmlns:a14="http://schemas.microsoft.com/office/drawing/2010/main" Requires="a14">
+      <mc:AlternateContent xmlns:mc="http://schemas.openxmlformats.org/markup-compatibility/2006" xmlns:a14="http://schemas.microsoft.com/office/drawing/2010/main">
+        <mc:Choice Requires="a14">
           <p:sp>
             <p:nvSpPr>
               <p:cNvPr id="2" name="Title 1">
@@ -3346,7 +3346,7 @@
             </p:nvSpPr>
             <p:spPr>
               <a:xfrm>
-                <a:off x="189285" y="2303093"/>
+                <a:off x="184086" y="1452578"/>
                 <a:ext cx="11806772" cy="2387600"/>
               </a:xfrm>
             </p:spPr>
@@ -3357,7 +3357,7 @@
               <a:lstStyle/>
               <a:p>
                 <a:r>
-                  <a:rPr lang="en-US" sz="3000" i="1" dirty="0" err="1">
+                  <a:rPr lang="en-US" sz="2400" i="1" dirty="0">
                     <a:latin typeface="Century Schoolbook" panose="02040604050505020304" pitchFamily="18" charset="0"/>
                   </a:rPr>
                   <a:t>t</a:t>
@@ -3371,67 +3371,67 @@
                     </a:solidFill>
                     <a:latin typeface="Century Schoolbook" panose="02040604050505020304" pitchFamily="18" charset="0"/>
                   </a:rPr>
-                  <a:t>Yuen</a:t>
+                  <a:t>Welch</a:t>
                 </a:r>
                 <a:r>
-                  <a:rPr lang="en-US" sz="3000" dirty="0">
+                  <a:rPr lang="en-US" sz="2400" dirty="0">
                     <a:latin typeface="Century Schoolbook" panose="02040604050505020304" pitchFamily="18" charset="0"/>
                   </a:rPr>
                   <a:t>(</a:t>
                 </a:r>
                 <a:r>
-                  <a:rPr lang="en-US" sz="3000" dirty="0">
+                  <a:rPr lang="en-US" sz="2400" dirty="0">
                     <a:solidFill>
                       <a:srgbClr val="00B0F0"/>
                     </a:solidFill>
                     <a:latin typeface="Century Schoolbook" panose="02040604050505020304" pitchFamily="18" charset="0"/>
                   </a:rPr>
-                  <a:t>14.79</a:t>
+                  <a:t>281.95</a:t>
                 </a:r>
                 <a:r>
-                  <a:rPr lang="en-US" sz="3000" dirty="0">
+                  <a:rPr lang="en-US" sz="2400" dirty="0">
                     <a:latin typeface="Century Schoolbook" panose="02040604050505020304" pitchFamily="18" charset="0"/>
                   </a:rPr>
                   <a:t>) = </a:t>
                 </a:r>
                 <a:r>
-                  <a:rPr lang="en-US" sz="3000" dirty="0">
+                  <a:rPr lang="en-US" sz="2400" dirty="0">
                     <a:solidFill>
                       <a:srgbClr val="FF0000"/>
                     </a:solidFill>
                     <a:latin typeface="Century Schoolbook" panose="02040604050505020304" pitchFamily="18" charset="0"/>
                   </a:rPr>
-                  <a:t>3.36</a:t>
+                  <a:t>-10.75</a:t>
                 </a:r>
                 <a:r>
-                  <a:rPr lang="en-US" sz="3000" dirty="0">
+                  <a:rPr lang="en-US" sz="2400" dirty="0">
                     <a:latin typeface="Century Schoolbook" panose="02040604050505020304" pitchFamily="18" charset="0"/>
                   </a:rPr>
                   <a:t>, </a:t>
                 </a:r>
                 <a:r>
-                  <a:rPr lang="en-US" sz="3000" i="1" dirty="0">
+                  <a:rPr lang="en-US" sz="2400" i="1" dirty="0">
                     <a:latin typeface="Century Schoolbook" panose="02040604050505020304" pitchFamily="18" charset="0"/>
                   </a:rPr>
                   <a:t>p</a:t>
                 </a:r>
                 <a:r>
-                  <a:rPr lang="en-US" sz="3000" dirty="0">
+                  <a:rPr lang="en-US" sz="2400" dirty="0">
                     <a:latin typeface="Century Schoolbook" panose="02040604050505020304" pitchFamily="18" charset="0"/>
                   </a:rPr>
                   <a:t> = </a:t>
                 </a:r>
                 <a:r>
-                  <a:rPr lang="en-US" sz="3000" dirty="0">
+                  <a:rPr lang="en-US" sz="2400" dirty="0">
                     <a:solidFill>
                       <a:srgbClr val="00B050"/>
                     </a:solidFill>
                     <a:latin typeface="Century Schoolbook" panose="02040604050505020304" pitchFamily="18" charset="0"/>
                   </a:rPr>
-                  <a:t>0.004</a:t>
+                  <a:t>8.31e-23</a:t>
                 </a:r>
                 <a:r>
-                  <a:rPr lang="en-US" sz="3000" dirty="0">
+                  <a:rPr lang="en-US" sz="2400" dirty="0">
                     <a:latin typeface="Century Schoolbook" panose="02040604050505020304" pitchFamily="18" charset="0"/>
                   </a:rPr>
                   <a:t>, </a:t>
@@ -3442,122 +3442,125 @@
                       <m:accPr>
                         <m:chr m:val="̂"/>
                         <m:ctrlPr>
-                          <a:rPr lang="el-GR" sz="3000" i="1" dirty="0" smtClean="0">
+                          <a:rPr lang="el-GR" sz="2400" i="1" dirty="0" smtClean="0">
                             <a:latin typeface="Cambria Math" panose="02040503050406030204" pitchFamily="18" charset="0"/>
                           </a:rPr>
                         </m:ctrlPr>
                       </m:accPr>
                       <m:e>
                         <m:r>
-                          <m:rPr>
-                            <m:sty m:val="p"/>
-                          </m:rPr>
-                          <a:rPr lang="el-GR" sz="3000" i="0" dirty="0">
+                          <a:rPr lang="en-US" sz="2400" b="0" i="1" dirty="0" smtClean="0">
                             <a:latin typeface="Cambria Math" panose="02040503050406030204" pitchFamily="18" charset="0"/>
                           </a:rPr>
-                          <m:t>ξ</m:t>
+                          <m:t>𝑔</m:t>
                         </m:r>
                       </m:e>
                     </m:acc>
                   </m:oMath>
                 </a14:m>
                 <a:r>
-                  <a:rPr lang="en-US" sz="3000" i="1" dirty="0">
+                  <a:rPr lang="en-US" sz="2000" baseline="-25000" dirty="0">
+                    <a:latin typeface="Century Schoolbook" panose="02040604050505020304" pitchFamily="18" charset="0"/>
+                  </a:rPr>
+                  <a:t>Hedges</a:t>
+                </a:r>
+                <a:r>
+                  <a:rPr lang="en-US" sz="2400" i="1" dirty="0">
                     <a:latin typeface="Century Schoolbook" panose="02040604050505020304" pitchFamily="18" charset="0"/>
                   </a:rPr>
                   <a:t> </a:t>
                 </a:r>
                 <a:r>
-                  <a:rPr lang="en-US" sz="3000" dirty="0">
+                  <a:rPr lang="en-US" sz="2400" dirty="0">
                     <a:latin typeface="Century Schoolbook" panose="02040604050505020304" pitchFamily="18" charset="0"/>
                   </a:rPr>
                   <a:t>= </a:t>
                 </a:r>
                 <a:r>
-                  <a:rPr lang="en-US" sz="3000" dirty="0">
+                  <a:rPr lang="en-US" sz="2400" dirty="0">
                     <a:solidFill>
                       <a:schemeClr val="accent2"/>
                     </a:solidFill>
                     <a:latin typeface="Century Schoolbook" panose="02040604050505020304" pitchFamily="18" charset="0"/>
                   </a:rPr>
-                  <a:t>0.77</a:t>
+                  <a:t>-1.27</a:t>
                 </a:r>
                 <a:r>
-                  <a:rPr lang="en-US" sz="3000" dirty="0">
+                  <a:rPr lang="en-US" sz="2400" dirty="0">
                     <a:latin typeface="Century Schoolbook" panose="02040604050505020304" pitchFamily="18" charset="0"/>
                   </a:rPr>
                   <a:t>, CI</a:t>
                 </a:r>
                 <a:r>
-                  <a:rPr lang="en-US" sz="3000" baseline="-25000" dirty="0">
+                  <a:rPr lang="en-US" sz="2000" baseline="-25000" dirty="0">
                     <a:latin typeface="Century Schoolbook" panose="02040604050505020304" pitchFamily="18" charset="0"/>
                   </a:rPr>
-                  <a:t>95%</a:t>
+                  <a:t>99%</a:t>
                 </a:r>
                 <a:r>
-                  <a:rPr lang="en-US" sz="3000" dirty="0">
+                  <a:rPr lang="en-US" sz="2400" dirty="0">
                     <a:latin typeface="Century Schoolbook" panose="02040604050505020304" pitchFamily="18" charset="0"/>
                   </a:rPr>
                   <a:t>[</a:t>
                 </a:r>
                 <a:r>
-                  <a:rPr lang="en-US" sz="3000" dirty="0">
+                  <a:rPr lang="en-US" sz="2400" dirty="0">
                     <a:solidFill>
                       <a:schemeClr val="accent2"/>
                     </a:solidFill>
                     <a:latin typeface="Century Schoolbook" panose="02040604050505020304" pitchFamily="18" charset="0"/>
                   </a:rPr>
-                  <a:t>0.47</a:t>
+                  <a:t>-1.61</a:t>
                 </a:r>
                 <a:r>
-                  <a:rPr lang="en-US" sz="3000" dirty="0">
+                  <a:rPr lang="en-US" sz="2400" dirty="0">
                     <a:latin typeface="Century Schoolbook" panose="02040604050505020304" pitchFamily="18" charset="0"/>
                   </a:rPr>
                   <a:t>, </a:t>
                 </a:r>
                 <a:r>
-                  <a:rPr lang="en-US" sz="3000" dirty="0">
+                  <a:rPr lang="en-US" sz="2400" dirty="0">
                     <a:solidFill>
                       <a:schemeClr val="accent2"/>
                     </a:solidFill>
                     <a:latin typeface="Century Schoolbook" panose="02040604050505020304" pitchFamily="18" charset="0"/>
                   </a:rPr>
-                  <a:t>0.90</a:t>
+                  <a:t>-0.94</a:t>
                 </a:r>
                 <a:r>
-                  <a:rPr lang="en-US" sz="3000" dirty="0">
+                  <a:rPr lang="en-US" sz="2400" dirty="0">
                     <a:latin typeface="Century Schoolbook" panose="02040604050505020304" pitchFamily="18" charset="0"/>
                   </a:rPr>
                   <a:t>], </a:t>
                 </a:r>
                 <a:r>
-                  <a:rPr lang="en-US" sz="3000" i="1" dirty="0">
+                  <a:rPr lang="en-US" sz="2400" i="1" dirty="0">
                     <a:latin typeface="Century Schoolbook" panose="02040604050505020304" pitchFamily="18" charset="0"/>
                   </a:rPr>
                   <a:t>n</a:t>
                 </a:r>
                 <a:r>
-                  <a:rPr lang="en-US" sz="3000" i="1" baseline="-25000" dirty="0">
+                  <a:rPr lang="en-US" sz="2000" baseline="-25000" dirty="0">
                     <a:latin typeface="Century Schoolbook" panose="02040604050505020304" pitchFamily="18" charset="0"/>
                   </a:rPr>
                   <a:t>obs</a:t>
                 </a:r>
                 <a:r>
-                  <a:rPr lang="en-US" sz="3000" dirty="0">
+                  <a:rPr lang="en-US" sz="2400" dirty="0">
                     <a:latin typeface="Century Schoolbook" panose="02040604050505020304" pitchFamily="18" charset="0"/>
                   </a:rPr>
                   <a:t> = </a:t>
                 </a:r>
                 <a:r>
-                  <a:rPr lang="en-US" sz="3000" dirty="0">
+                  <a:rPr lang="en-US" sz="2400" dirty="0">
                     <a:solidFill>
                       <a:schemeClr val="accent1"/>
                     </a:solidFill>
                     <a:latin typeface="Century Schoolbook" panose="02040604050505020304" pitchFamily="18" charset="0"/>
                   </a:rPr>
-                  <a:t>32</a:t>
+                  <a:t>284</a:t>
                 </a:r>
-                <a:endParaRPr lang="en-US" sz="3000" baseline="-25000" dirty="0">
+                <a:endParaRPr lang="en-US" sz="2400" baseline="-25000" dirty="0">
                   <a:solidFill>
                     <a:schemeClr val="accent1"/>
                   </a:solidFill>
@@ -3567,7 +3570,7 @@
             </p:txBody>
           </p:sp>
         </mc:Choice>
-        <mc:Fallback>
+        <mc:Fallback xmlns="">
           <p:sp>
             <p:nvSpPr>
               <p:cNvPr id="2" name="Title 1">
@@ -3586,7 +3589,7 @@
             </p:nvSpPr>
             <p:spPr>
               <a:xfrm>
-                <a:off x="189285" y="2303093"/>
+                <a:off x="184086" y="1452578"/>
                 <a:ext cx="11806772" cy="2387600"/>
               </a:xfrm>
               <a:blipFill>
@@ -3622,14 +3625,13 @@
           </p:cNvPr>
           <p:cNvCxnSpPr>
             <a:cxnSpLocks/>
-            <a:endCxn id="9" idx="2"/>
           </p:cNvCxnSpPr>
           <p:nvPr/>
         </p:nvCxnSpPr>
         <p:spPr>
-          <a:xfrm flipV="1">
-            <a:off x="1792101" y="2441592"/>
-            <a:ext cx="0" cy="713743"/>
+          <a:xfrm flipH="1" flipV="1">
+            <a:off x="2025789" y="1609697"/>
+            <a:ext cx="9354" cy="749058"/>
           </a:xfrm>
           <a:prstGeom prst="straightConnector1">
             <a:avLst/>
@@ -3670,8 +3672,8 @@
         </p:nvSpPr>
         <p:spPr>
           <a:xfrm>
-            <a:off x="1139518" y="2072260"/>
-            <a:ext cx="1305165" cy="369332"/>
+            <a:off x="1472810" y="1241875"/>
+            <a:ext cx="1181734" cy="338554"/>
           </a:xfrm>
           <a:prstGeom prst="rect">
             <a:avLst/>
@@ -3685,7 +3687,7 @@
           <a:lstStyle/>
           <a:p>
             <a:r>
-              <a:rPr lang="en-US" dirty="0">
+              <a:rPr lang="en-US" sz="1600" dirty="0">
                 <a:solidFill>
                   <a:srgbClr val="00B0F0"/>
                 </a:solidFill>
@@ -3712,7 +3714,7 @@
         </p:nvCxnSpPr>
         <p:spPr>
           <a:xfrm flipH="1" flipV="1">
-            <a:off x="3160007" y="2441592"/>
+            <a:off x="3280786" y="1613759"/>
             <a:ext cx="1" cy="713743"/>
           </a:xfrm>
           <a:prstGeom prst="straightConnector1">
@@ -3754,8 +3756,8 @@
         </p:nvSpPr>
         <p:spPr>
           <a:xfrm>
-            <a:off x="2575560" y="2072260"/>
-            <a:ext cx="1043876" cy="369332"/>
+            <a:off x="2824524" y="1231611"/>
+            <a:ext cx="947695" cy="338554"/>
           </a:xfrm>
           <a:prstGeom prst="rect">
             <a:avLst/>
@@ -3769,7 +3771,7 @@
           <a:lstStyle/>
           <a:p>
             <a:r>
-              <a:rPr lang="en-US" dirty="0">
+              <a:rPr lang="en-US" sz="1600" dirty="0">
                 <a:solidFill>
                   <a:srgbClr val="FF0000"/>
                 </a:solidFill>
@@ -3796,7 +3798,7 @@
         </p:nvCxnSpPr>
         <p:spPr>
           <a:xfrm flipH="1" flipV="1">
-            <a:off x="4797994" y="2441592"/>
+            <a:off x="4792795" y="1591077"/>
             <a:ext cx="1" cy="713743"/>
           </a:xfrm>
           <a:prstGeom prst="straightConnector1">
@@ -3838,8 +3840,8 @@
         </p:nvSpPr>
         <p:spPr>
           <a:xfrm>
-            <a:off x="4213547" y="2072260"/>
-            <a:ext cx="1439818" cy="369332"/>
+            <a:off x="4208348" y="1221745"/>
+            <a:ext cx="1300356" cy="338554"/>
           </a:xfrm>
           <a:prstGeom prst="rect">
             <a:avLst/>
@@ -3853,7 +3855,7 @@
           <a:lstStyle/>
           <a:p>
             <a:r>
-              <a:rPr lang="en-US" dirty="0">
+              <a:rPr lang="en-US" sz="1600" dirty="0">
                 <a:solidFill>
                   <a:srgbClr val="00B050"/>
                 </a:solidFill>
@@ -3880,7 +3882,7 @@
         </p:nvCxnSpPr>
         <p:spPr>
           <a:xfrm flipV="1">
-            <a:off x="6818484" y="2487761"/>
+            <a:off x="6813285" y="1637246"/>
             <a:ext cx="459428" cy="721509"/>
           </a:xfrm>
           <a:prstGeom prst="straightConnector1">
@@ -3922,8 +3924,8 @@
         </p:nvSpPr>
         <p:spPr>
           <a:xfrm>
-            <a:off x="6670842" y="1841428"/>
-            <a:ext cx="2316660" cy="646331"/>
+            <a:off x="6379508" y="990913"/>
+            <a:ext cx="2888932" cy="584775"/>
           </a:xfrm>
           <a:prstGeom prst="rect">
             <a:avLst/>
@@ -3938,19 +3940,19 @@
           <a:p>
             <a:pPr algn="ctr"/>
             <a:r>
-              <a:rPr lang="en-US" dirty="0">
+              <a:rPr lang="en-US" sz="1600" dirty="0">
                 <a:solidFill>
                   <a:schemeClr val="accent2"/>
                 </a:solidFill>
                 <a:latin typeface="Century Schoolbook" panose="02040604050505020304" pitchFamily="18" charset="0"/>
               </a:rPr>
-              <a:t>effect size + </a:t>
+              <a:t>effect size type + estimate + </a:t>
             </a:r>
           </a:p>
           <a:p>
             <a:pPr algn="ctr"/>
             <a:r>
-              <a:rPr lang="en-US" dirty="0">
+              <a:rPr lang="en-US" sz="1600" dirty="0">
                 <a:solidFill>
                   <a:schemeClr val="accent2"/>
                 </a:solidFill>
@@ -3972,14 +3974,13 @@
           </p:cNvPr>
           <p:cNvCxnSpPr>
             <a:cxnSpLocks/>
-            <a:endCxn id="19" idx="2"/>
           </p:cNvCxnSpPr>
           <p:nvPr/>
         </p:nvCxnSpPr>
         <p:spPr>
           <a:xfrm flipH="1" flipV="1">
-            <a:off x="7829172" y="2487759"/>
-            <a:ext cx="525679" cy="721511"/>
+            <a:off x="7823975" y="1637245"/>
+            <a:ext cx="525680" cy="721511"/>
           </a:xfrm>
           <a:prstGeom prst="straightConnector1">
             <a:avLst/>
@@ -4022,7 +4023,7 @@
         </p:nvCxnSpPr>
         <p:spPr>
           <a:xfrm flipH="1" flipV="1">
-            <a:off x="8593902" y="2487760"/>
+            <a:off x="8588703" y="1637245"/>
             <a:ext cx="944860" cy="721510"/>
           </a:xfrm>
           <a:prstGeom prst="straightConnector1">
@@ -4066,7 +4067,7 @@
         </p:nvCxnSpPr>
         <p:spPr>
           <a:xfrm flipH="1" flipV="1">
-            <a:off x="11024457" y="2465906"/>
+            <a:off x="11019258" y="1615391"/>
             <a:ext cx="1" cy="713743"/>
           </a:xfrm>
           <a:prstGeom prst="straightConnector1">
@@ -4108,8 +4109,8 @@
         </p:nvSpPr>
         <p:spPr>
           <a:xfrm>
-            <a:off x="10239872" y="1795261"/>
-            <a:ext cx="1531188" cy="646331"/>
+            <a:off x="10310014" y="944746"/>
+            <a:ext cx="1380506" cy="584775"/>
           </a:xfrm>
           <a:prstGeom prst="rect">
             <a:avLst/>
@@ -4124,7 +4125,7 @@
           <a:p>
             <a:pPr algn="ctr"/>
             <a:r>
-              <a:rPr lang="en-US" dirty="0">
+              <a:rPr lang="en-US" sz="1600" dirty="0">
                 <a:solidFill>
                   <a:schemeClr val="accent1"/>
                 </a:solidFill>
@@ -4136,7 +4137,7 @@
           <a:p>
             <a:pPr algn="ctr"/>
             <a:r>
-              <a:rPr lang="en-US" dirty="0">
+              <a:rPr lang="en-US" sz="1600" dirty="0">
                 <a:solidFill>
                   <a:schemeClr val="accent1"/>
                 </a:solidFill>
@@ -4163,8 +4164,8 @@
         </p:nvCxnSpPr>
         <p:spPr>
           <a:xfrm flipV="1">
-            <a:off x="692268" y="2445415"/>
-            <a:ext cx="0" cy="713743"/>
+            <a:off x="1052651" y="1645013"/>
+            <a:ext cx="0" cy="713742"/>
           </a:xfrm>
           <a:prstGeom prst="straightConnector1">
             <a:avLst/>
@@ -4205,8 +4206,8 @@
         </p:nvSpPr>
         <p:spPr>
           <a:xfrm>
-            <a:off x="445052" y="2096574"/>
-            <a:ext cx="587020" cy="369332"/>
+            <a:off x="765613" y="1255783"/>
+            <a:ext cx="542136" cy="338554"/>
           </a:xfrm>
           <a:prstGeom prst="rect">
             <a:avLst/>
@@ -4220,7 +4221,7 @@
           <a:lstStyle/>
           <a:p>
             <a:r>
-              <a:rPr lang="en-US" dirty="0">
+              <a:rPr lang="en-US" sz="1600" dirty="0">
                 <a:solidFill>
                   <a:schemeClr val="accent4">
                     <a:lumMod val="75000"/>
@@ -4233,6 +4234,1103 @@
           </a:p>
         </p:txBody>
       </p:sp>
+      <p:sp>
+        <p:nvSpPr>
+          <p:cNvPr id="3" name="Rectangle 2">
+            <a:extLst>
+              <a:ext uri="{FF2B5EF4-FFF2-40B4-BE49-F238E27FC236}">
+                <a16:creationId xmlns:a16="http://schemas.microsoft.com/office/drawing/2014/main" id="{FB873CD5-0AF3-D942-A352-0CE950DB0FD2}"/>
+              </a:ext>
+            </a:extLst>
+          </p:cNvPr>
+          <p:cNvSpPr/>
+          <p:nvPr/>
+        </p:nvSpPr>
+        <p:spPr>
+          <a:xfrm>
+            <a:off x="397634" y="449945"/>
+            <a:ext cx="11115040" cy="352541"/>
+          </a:xfrm>
+          <a:prstGeom prst="rect">
+            <a:avLst/>
+          </a:prstGeom>
+          <a:noFill/>
+          <a:ln>
+            <a:noFill/>
+          </a:ln>
+        </p:spPr>
+        <p:style>
+          <a:lnRef idx="2">
+            <a:schemeClr val="accent1">
+              <a:shade val="50000"/>
+            </a:schemeClr>
+          </a:lnRef>
+          <a:fillRef idx="1">
+            <a:schemeClr val="accent1"/>
+          </a:fillRef>
+          <a:effectRef idx="0">
+            <a:schemeClr val="accent1"/>
+          </a:effectRef>
+          <a:fontRef idx="minor">
+            <a:schemeClr val="lt1"/>
+          </a:fontRef>
+        </p:style>
+        <p:txBody>
+          <a:bodyPr rtlCol="0" anchor="ctr"/>
+          <a:lstStyle/>
+          <a:p>
+            <a:pPr algn="ctr"/>
+            <a:r>
+              <a:rPr lang="de-DE" sz="2000" b="1" dirty="0">
+                <a:solidFill>
+                  <a:schemeClr val="tx1"/>
+                </a:solidFill>
+                <a:latin typeface="Century Schoolbook" panose="02040604050505020304" pitchFamily="18" charset="0"/>
+              </a:rPr>
+              <a:t>Template </a:t>
+            </a:r>
+            <a:r>
+              <a:rPr lang="de-DE" sz="2000" b="1" dirty="0" err="1">
+                <a:solidFill>
+                  <a:schemeClr val="tx1"/>
+                </a:solidFill>
+                <a:latin typeface="Century Schoolbook" panose="02040604050505020304" pitchFamily="18" charset="0"/>
+              </a:rPr>
+              <a:t>for</a:t>
+            </a:r>
+            <a:r>
+              <a:rPr lang="de-DE" sz="2000" b="1" dirty="0">
+                <a:solidFill>
+                  <a:schemeClr val="tx1"/>
+                </a:solidFill>
+                <a:latin typeface="Century Schoolbook" panose="02040604050505020304" pitchFamily="18" charset="0"/>
+              </a:rPr>
+              <a:t> non-</a:t>
+            </a:r>
+            <a:r>
+              <a:rPr lang="de-DE" sz="2000" b="1" dirty="0" err="1">
+                <a:solidFill>
+                  <a:schemeClr val="tx1"/>
+                </a:solidFill>
+                <a:latin typeface="Century Schoolbook" panose="02040604050505020304" pitchFamily="18" charset="0"/>
+              </a:rPr>
+              <a:t>Bayesian</a:t>
+            </a:r>
+            <a:r>
+              <a:rPr lang="de-DE" sz="2000" b="1" dirty="0">
+                <a:solidFill>
+                  <a:schemeClr val="tx1"/>
+                </a:solidFill>
+                <a:latin typeface="Century Schoolbook" panose="02040604050505020304" pitchFamily="18" charset="0"/>
+              </a:rPr>
+              <a:t> </a:t>
+            </a:r>
+            <a:r>
+              <a:rPr lang="de-DE" sz="2000" b="1" dirty="0" err="1">
+                <a:solidFill>
+                  <a:schemeClr val="tx1"/>
+                </a:solidFill>
+                <a:latin typeface="Century Schoolbook" panose="02040604050505020304" pitchFamily="18" charset="0"/>
+              </a:rPr>
+              <a:t>analysis</a:t>
+            </a:r>
+            <a:endParaRPr lang="de-DE" sz="2000" b="1" dirty="0">
+              <a:solidFill>
+                <a:schemeClr val="tx1"/>
+              </a:solidFill>
+              <a:latin typeface="Century Schoolbook" panose="02040604050505020304" pitchFamily="18" charset="0"/>
+            </a:endParaRPr>
+          </a:p>
+        </p:txBody>
+      </p:sp>
+      <mc:AlternateContent xmlns:mc="http://schemas.openxmlformats.org/markup-compatibility/2006">
+        <mc:Choice xmlns:a14="http://schemas.microsoft.com/office/drawing/2010/main" Requires="a14">
+          <p:sp>
+            <p:nvSpPr>
+              <p:cNvPr id="20" name="Title 1">
+                <a:extLst>
+                  <a:ext uri="{FF2B5EF4-FFF2-40B4-BE49-F238E27FC236}">
+                    <a16:creationId xmlns:a16="http://schemas.microsoft.com/office/drawing/2014/main" id="{38FF9584-55A2-CC4A-AE51-6179CAD3B638}"/>
+                  </a:ext>
+                </a:extLst>
+              </p:cNvPr>
+              <p:cNvSpPr txBox="1">
+                <a:spLocks/>
+              </p:cNvSpPr>
+              <p:nvPr/>
+            </p:nvSpPr>
+            <p:spPr>
+              <a:xfrm>
+                <a:off x="268269" y="4713286"/>
+                <a:ext cx="11806772" cy="2387600"/>
+              </a:xfrm>
+              <a:prstGeom prst="rect">
+                <a:avLst/>
+              </a:prstGeom>
+            </p:spPr>
+            <p:txBody>
+              <a:bodyPr vert="horz" lIns="91440" tIns="45720" rIns="91440" bIns="45720" rtlCol="0" anchor="ctr">
+                <a:normAutofit/>
+              </a:bodyPr>
+              <a:lstStyle>
+                <a:lvl1pPr algn="ctr" defTabSz="914400" rtl="0" eaLnBrk="1" latinLnBrk="0" hangingPunct="1">
+                  <a:lnSpc>
+                    <a:spcPct val="90000"/>
+                  </a:lnSpc>
+                  <a:spcBef>
+                    <a:spcPct val="0"/>
+                  </a:spcBef>
+                  <a:buNone/>
+                  <a:defRPr sz="6000" kern="1200">
+                    <a:solidFill>
+                      <a:schemeClr val="tx1"/>
+                    </a:solidFill>
+                    <a:latin typeface="+mj-lt"/>
+                    <a:ea typeface="+mj-ea"/>
+                    <a:cs typeface="+mj-cs"/>
+                  </a:defRPr>
+                </a:lvl1pPr>
+              </a:lstStyle>
+              <a:p>
+                <a:r>
+                  <a:rPr lang="en-US" sz="2400" dirty="0">
+                    <a:latin typeface="Century Schoolbook" panose="02040604050505020304" pitchFamily="18" charset="0"/>
+                  </a:rPr>
+                  <a:t>log</a:t>
+                </a:r>
+                <a:r>
+                  <a:rPr lang="en-US" sz="2000" baseline="-25000" dirty="0">
+                    <a:latin typeface="Century Schoolbook" panose="02040604050505020304" pitchFamily="18" charset="0"/>
+                  </a:rPr>
+                  <a:t>e</a:t>
+                </a:r>
+                <a:r>
+                  <a:rPr lang="en-US" sz="2400" dirty="0">
+                    <a:latin typeface="Century Schoolbook" panose="02040604050505020304" pitchFamily="18" charset="0"/>
+                  </a:rPr>
+                  <a:t>(</a:t>
+                </a:r>
+                <a:r>
+                  <a:rPr lang="en-US" sz="2400" dirty="0">
+                    <a:solidFill>
+                      <a:srgbClr val="00B0F0"/>
+                    </a:solidFill>
+                    <a:latin typeface="Century Schoolbook" panose="02040604050505020304" pitchFamily="18" charset="0"/>
+                  </a:rPr>
+                  <a:t>BF</a:t>
+                </a:r>
+                <a:r>
+                  <a:rPr lang="en-US" sz="2400" baseline="-25000" dirty="0">
+                    <a:solidFill>
+                      <a:srgbClr val="00B0F0"/>
+                    </a:solidFill>
+                    <a:latin typeface="Century Schoolbook" panose="02040604050505020304" pitchFamily="18" charset="0"/>
+                  </a:rPr>
+                  <a:t>01</a:t>
+                </a:r>
+                <a:r>
+                  <a:rPr lang="en-US" sz="2400" dirty="0">
+                    <a:latin typeface="Century Schoolbook" panose="02040604050505020304" pitchFamily="18" charset="0"/>
+                  </a:rPr>
+                  <a:t>) = </a:t>
+                </a:r>
+                <a:r>
+                  <a:rPr lang="en-US" sz="2400" dirty="0">
+                    <a:solidFill>
+                      <a:srgbClr val="FF0000"/>
+                    </a:solidFill>
+                    <a:latin typeface="Century Schoolbook" panose="02040604050505020304" pitchFamily="18" charset="0"/>
+                  </a:rPr>
+                  <a:t>-6.20</a:t>
+                </a:r>
+                <a:r>
+                  <a:rPr lang="en-US" sz="2400" dirty="0">
+                    <a:latin typeface="Century Schoolbook" panose="02040604050505020304" pitchFamily="18" charset="0"/>
+                  </a:rPr>
+                  <a:t>, </a:t>
+                </a:r>
+                <a14:m>
+                  <m:oMath xmlns:m="http://schemas.openxmlformats.org/officeDocument/2006/math">
+                    <m:sSubSup>
+                      <m:sSubSupPr>
+                        <m:ctrlPr>
+                          <a:rPr lang="en-US" sz="2000" i="1">
+                            <a:latin typeface="Cambria Math" panose="02040503050406030204" pitchFamily="18" charset="0"/>
+                          </a:rPr>
+                        </m:ctrlPr>
+                      </m:sSubSupPr>
+                      <m:e>
+                        <m:r>
+                          <m:rPr>
+                            <m:sty m:val="p"/>
+                          </m:rPr>
+                          <a:rPr lang="el-GR" sz="2000" i="0" dirty="0">
+                            <a:latin typeface="Cambria Math" panose="02040503050406030204" pitchFamily="18" charset="0"/>
+                            <a:ea typeface="Cambria Math" panose="02040503050406030204" pitchFamily="18" charset="0"/>
+                          </a:rPr>
+                          <m:t>δ</m:t>
+                        </m:r>
+                      </m:e>
+                      <m:sub>
+                        <m:r>
+                          <m:rPr>
+                            <m:nor/>
+                          </m:rPr>
+                          <a:rPr lang="en-US" sz="2000" b="0" baseline="-25000" dirty="0" smtClean="0">
+                            <a:latin typeface="Century Schoolbook" panose="02040604050505020304" pitchFamily="18" charset="0"/>
+                            <a:ea typeface="Cambria Math" panose="02040503050406030204" pitchFamily="18" charset="0"/>
+                          </a:rPr>
+                          <m:t>difference</m:t>
+                        </m:r>
+                      </m:sub>
+                      <m:sup>
+                        <m:r>
+                          <m:rPr>
+                            <m:sty m:val="p"/>
+                          </m:rPr>
+                          <a:rPr lang="en-US" sz="2000" b="0" i="0" smtClean="0">
+                            <a:latin typeface="Cambria Math" panose="02040503050406030204" pitchFamily="18" charset="0"/>
+                          </a:rPr>
+                          <m:t>posterior</m:t>
+                        </m:r>
+                      </m:sup>
+                    </m:sSubSup>
+                    <m:r>
+                      <a:rPr lang="en-US" sz="2000" i="0">
+                        <a:latin typeface="Cambria Math" panose="02040503050406030204" pitchFamily="18" charset="0"/>
+                      </a:rPr>
+                      <m:t> </m:t>
+                    </m:r>
+                  </m:oMath>
+                </a14:m>
+                <a:r>
+                  <a:rPr lang="en-US" sz="2400" dirty="0">
+                    <a:latin typeface="Century Schoolbook" panose="02040604050505020304" pitchFamily="18" charset="0"/>
+                  </a:rPr>
+                  <a:t>= </a:t>
+                </a:r>
+                <a:r>
+                  <a:rPr lang="en-US" sz="2400" dirty="0">
+                    <a:solidFill>
+                      <a:schemeClr val="accent2"/>
+                    </a:solidFill>
+                    <a:latin typeface="Century Schoolbook" panose="02040604050505020304" pitchFamily="18" charset="0"/>
+                  </a:rPr>
+                  <a:t>-5.06</a:t>
+                </a:r>
+                <a:r>
+                  <a:rPr lang="en-US" sz="2400" dirty="0">
+                    <a:latin typeface="Century Schoolbook" panose="02040604050505020304" pitchFamily="18" charset="0"/>
+                  </a:rPr>
+                  <a:t>, </a:t>
+                </a:r>
+                <a14:m>
+                  <m:oMath xmlns:m="http://schemas.openxmlformats.org/officeDocument/2006/math">
+                    <m:sSubSup>
+                      <m:sSubSupPr>
+                        <m:ctrlPr>
+                          <a:rPr lang="en-US" sz="2000" i="1" smtClean="0">
+                            <a:latin typeface="Cambria Math" panose="02040503050406030204" pitchFamily="18" charset="0"/>
+                          </a:rPr>
+                        </m:ctrlPr>
+                      </m:sSubSupPr>
+                      <m:e>
+                        <m:r>
+                          <m:rPr>
+                            <m:nor/>
+                          </m:rPr>
+                          <a:rPr lang="en-US" sz="2000" dirty="0">
+                            <a:latin typeface="Century Schoolbook" panose="02040604050505020304" pitchFamily="18" charset="0"/>
+                          </a:rPr>
+                          <m:t>CI</m:t>
+                        </m:r>
+                      </m:e>
+                      <m:sub>
+                        <m:r>
+                          <m:rPr>
+                            <m:nor/>
+                          </m:rPr>
+                          <a:rPr lang="en-US" sz="2000" baseline="-25000" dirty="0">
+                            <a:latin typeface="Century Schoolbook" panose="02040604050505020304" pitchFamily="18" charset="0"/>
+                          </a:rPr>
+                          <m:t>95%</m:t>
+                        </m:r>
+                      </m:sub>
+                      <m:sup>
+                        <m:r>
+                          <m:rPr>
+                            <m:sty m:val="p"/>
+                          </m:rPr>
+                          <a:rPr lang="en-US" sz="2000" b="0" i="0" smtClean="0">
+                            <a:latin typeface="Cambria Math" panose="02040503050406030204" pitchFamily="18" charset="0"/>
+                          </a:rPr>
+                          <m:t>HDI</m:t>
+                        </m:r>
+                      </m:sup>
+                    </m:sSubSup>
+                  </m:oMath>
+                </a14:m>
+                <a:r>
+                  <a:rPr lang="en-US" sz="2400" baseline="-25000" dirty="0">
+                    <a:latin typeface="Century Schoolbook" panose="02040604050505020304" pitchFamily="18" charset="0"/>
+                  </a:rPr>
+                  <a:t> </a:t>
+                </a:r>
+                <a:r>
+                  <a:rPr lang="en-US" sz="2400" dirty="0">
+                    <a:latin typeface="Century Schoolbook" panose="02040604050505020304" pitchFamily="18" charset="0"/>
+                  </a:rPr>
+                  <a:t>[</a:t>
+                </a:r>
+                <a:r>
+                  <a:rPr lang="en-US" sz="2400" dirty="0">
+                    <a:solidFill>
+                      <a:schemeClr val="accent2"/>
+                    </a:solidFill>
+                    <a:latin typeface="Century Schoolbook" panose="02040604050505020304" pitchFamily="18" charset="0"/>
+                  </a:rPr>
+                  <a:t>-6.75</a:t>
+                </a:r>
+                <a:r>
+                  <a:rPr lang="en-US" sz="2400" dirty="0">
+                    <a:latin typeface="Century Schoolbook" panose="02040604050505020304" pitchFamily="18" charset="0"/>
+                  </a:rPr>
+                  <a:t>, </a:t>
+                </a:r>
+                <a:r>
+                  <a:rPr lang="en-US" sz="2400" dirty="0">
+                    <a:solidFill>
+                      <a:schemeClr val="accent2"/>
+                    </a:solidFill>
+                    <a:latin typeface="Century Schoolbook" panose="02040604050505020304" pitchFamily="18" charset="0"/>
+                  </a:rPr>
+                  <a:t>-3.53</a:t>
+                </a:r>
+                <a:r>
+                  <a:rPr lang="en-US" sz="2400" dirty="0">
+                    <a:latin typeface="Century Schoolbook" panose="02040604050505020304" pitchFamily="18" charset="0"/>
+                  </a:rPr>
+                  <a:t>], </a:t>
+                </a:r>
+                <a14:m>
+                  <m:oMath xmlns:m="http://schemas.openxmlformats.org/officeDocument/2006/math">
+                    <m:sSubSup>
+                      <m:sSubSupPr>
+                        <m:ctrlPr>
+                          <a:rPr lang="en-US" sz="2000" i="1">
+                            <a:latin typeface="Cambria Math" panose="02040503050406030204" pitchFamily="18" charset="0"/>
+                          </a:rPr>
+                        </m:ctrlPr>
+                      </m:sSubSupPr>
+                      <m:e>
+                        <m:r>
+                          <a:rPr lang="en-US" sz="2000" b="0" i="1" smtClean="0">
+                            <a:latin typeface="Cambria Math" panose="02040503050406030204" pitchFamily="18" charset="0"/>
+                          </a:rPr>
+                          <m:t>𝑟</m:t>
+                        </m:r>
+                      </m:e>
+                      <m:sub>
+                        <m:r>
+                          <m:rPr>
+                            <m:nor/>
+                          </m:rPr>
+                          <a:rPr lang="en-US" sz="2000" b="0" i="0" dirty="0" smtClean="0">
+                            <a:latin typeface="Cambria Math" panose="02040503050406030204" pitchFamily="18" charset="0"/>
+                            <a:ea typeface="Cambria Math" panose="02040503050406030204" pitchFamily="18" charset="0"/>
+                          </a:rPr>
+                          <m:t>cauchy</m:t>
+                        </m:r>
+                      </m:sub>
+                      <m:sup>
+                        <m:r>
+                          <m:rPr>
+                            <m:sty m:val="p"/>
+                          </m:rPr>
+                          <a:rPr lang="en-US" sz="2000" b="0" i="0" smtClean="0">
+                            <a:latin typeface="Cambria Math" panose="02040503050406030204" pitchFamily="18" charset="0"/>
+                          </a:rPr>
+                          <m:t>JZS</m:t>
+                        </m:r>
+                      </m:sup>
+                    </m:sSubSup>
+                  </m:oMath>
+                </a14:m>
+                <a:r>
+                  <a:rPr lang="en-US" sz="2400" dirty="0">
+                    <a:latin typeface="Century Schoolbook" panose="02040604050505020304" pitchFamily="18" charset="0"/>
+                  </a:rPr>
+                  <a:t> = </a:t>
+                </a:r>
+                <a:r>
+                  <a:rPr lang="en-US" sz="2400" dirty="0">
+                    <a:solidFill>
+                      <a:schemeClr val="accent1"/>
+                    </a:solidFill>
+                    <a:latin typeface="Century Schoolbook" panose="02040604050505020304" pitchFamily="18" charset="0"/>
+                  </a:rPr>
+                  <a:t>0.71</a:t>
+                </a:r>
+                <a:endParaRPr lang="en-US" sz="2400" baseline="-25000" dirty="0">
+                  <a:solidFill>
+                    <a:schemeClr val="accent1"/>
+                  </a:solidFill>
+                  <a:latin typeface="Century Schoolbook" panose="02040604050505020304" pitchFamily="18" charset="0"/>
+                </a:endParaRPr>
+              </a:p>
+            </p:txBody>
+          </p:sp>
+        </mc:Choice>
+        <mc:Fallback>
+          <p:sp>
+            <p:nvSpPr>
+              <p:cNvPr id="20" name="Title 1">
+                <a:extLst>
+                  <a:ext uri="{FF2B5EF4-FFF2-40B4-BE49-F238E27FC236}">
+                    <a16:creationId xmlns:a16="http://schemas.microsoft.com/office/drawing/2014/main" id="{38FF9584-55A2-CC4A-AE51-6179CAD3B638}"/>
+                  </a:ext>
+                </a:extLst>
+              </p:cNvPr>
+              <p:cNvSpPr txBox="1">
+                <a:spLocks noRot="1" noChangeAspect="1" noMove="1" noResize="1" noEditPoints="1" noAdjustHandles="1" noChangeArrowheads="1" noChangeShapeType="1" noTextEdit="1"/>
+              </p:cNvSpPr>
+              <p:nvPr/>
+            </p:nvSpPr>
+            <p:spPr>
+              <a:xfrm>
+                <a:off x="268269" y="4713286"/>
+                <a:ext cx="11806772" cy="2387600"/>
+              </a:xfrm>
+              <a:prstGeom prst="rect">
+                <a:avLst/>
+              </a:prstGeom>
+              <a:blipFill>
+                <a:blip r:embed="rId3"/>
+                <a:stretch>
+                  <a:fillRect/>
+                </a:stretch>
+              </a:blipFill>
+            </p:spPr>
+            <p:txBody>
+              <a:bodyPr/>
+              <a:lstStyle/>
+              <a:p>
+                <a:r>
+                  <a:rPr lang="de-DE">
+                    <a:noFill/>
+                  </a:rPr>
+                  <a:t> </a:t>
+                </a:r>
+              </a:p>
+            </p:txBody>
+          </p:sp>
+        </mc:Fallback>
+      </mc:AlternateContent>
+      <p:cxnSp>
+        <p:nvCxnSpPr>
+          <p:cNvPr id="21" name="Straight Arrow Connector 20">
+            <a:extLst>
+              <a:ext uri="{FF2B5EF4-FFF2-40B4-BE49-F238E27FC236}">
+                <a16:creationId xmlns:a16="http://schemas.microsoft.com/office/drawing/2014/main" id="{E4700875-4DAB-3B48-8687-C181C6395F66}"/>
+              </a:ext>
+            </a:extLst>
+          </p:cNvPr>
+          <p:cNvCxnSpPr>
+            <a:cxnSpLocks/>
+          </p:cNvCxnSpPr>
+          <p:nvPr/>
+        </p:nvCxnSpPr>
+        <p:spPr>
+          <a:xfrm flipH="1" flipV="1">
+            <a:off x="1934094" y="4849906"/>
+            <a:ext cx="2" cy="665696"/>
+          </a:xfrm>
+          <a:prstGeom prst="straightConnector1">
+            <a:avLst/>
+          </a:prstGeom>
+          <a:ln>
+            <a:solidFill>
+              <a:schemeClr val="tx1"/>
+            </a:solidFill>
+            <a:tailEnd type="triangle"/>
+          </a:ln>
+        </p:spPr>
+        <p:style>
+          <a:lnRef idx="1">
+            <a:schemeClr val="accent1"/>
+          </a:lnRef>
+          <a:fillRef idx="0">
+            <a:schemeClr val="accent1"/>
+          </a:fillRef>
+          <a:effectRef idx="0">
+            <a:schemeClr val="accent1"/>
+          </a:effectRef>
+          <a:fontRef idx="minor">
+            <a:schemeClr val="tx1"/>
+          </a:fontRef>
+        </p:style>
+      </p:cxnSp>
+      <p:sp>
+        <p:nvSpPr>
+          <p:cNvPr id="24" name="TextBox 23">
+            <a:extLst>
+              <a:ext uri="{FF2B5EF4-FFF2-40B4-BE49-F238E27FC236}">
+                <a16:creationId xmlns:a16="http://schemas.microsoft.com/office/drawing/2014/main" id="{E2349EFE-99D7-6F49-940F-A06147A96552}"/>
+              </a:ext>
+            </a:extLst>
+          </p:cNvPr>
+          <p:cNvSpPr txBox="1"/>
+          <p:nvPr/>
+        </p:nvSpPr>
+        <p:spPr>
+          <a:xfrm>
+            <a:off x="731330" y="3877725"/>
+            <a:ext cx="2124592" cy="830997"/>
+          </a:xfrm>
+          <a:prstGeom prst="rect">
+            <a:avLst/>
+          </a:prstGeom>
+          <a:noFill/>
+        </p:spPr>
+        <p:txBody>
+          <a:bodyPr wrap="square" rtlCol="0">
+            <a:spAutoFit/>
+          </a:bodyPr>
+          <a:lstStyle/>
+          <a:p>
+            <a:pPr algn="ctr"/>
+            <a:r>
+              <a:rPr lang="en-US" sz="1600" dirty="0">
+                <a:solidFill>
+                  <a:srgbClr val="00B0F0"/>
+                </a:solidFill>
+                <a:latin typeface="Century Schoolbook" panose="02040604050505020304" pitchFamily="18" charset="0"/>
+              </a:rPr>
+              <a:t>evidence in favor of null over alternative hypothesis</a:t>
+            </a:r>
+          </a:p>
+        </p:txBody>
+      </p:sp>
+      <p:cxnSp>
+        <p:nvCxnSpPr>
+          <p:cNvPr id="25" name="Straight Arrow Connector 24">
+            <a:extLst>
+              <a:ext uri="{FF2B5EF4-FFF2-40B4-BE49-F238E27FC236}">
+                <a16:creationId xmlns:a16="http://schemas.microsoft.com/office/drawing/2014/main" id="{DA315091-8829-8D46-B30E-0C49E6C0A872}"/>
+              </a:ext>
+            </a:extLst>
+          </p:cNvPr>
+          <p:cNvCxnSpPr>
+            <a:cxnSpLocks/>
+          </p:cNvCxnSpPr>
+          <p:nvPr/>
+        </p:nvCxnSpPr>
+        <p:spPr>
+          <a:xfrm flipH="1" flipV="1">
+            <a:off x="3685037" y="4792402"/>
+            <a:ext cx="1" cy="713743"/>
+          </a:xfrm>
+          <a:prstGeom prst="straightConnector1">
+            <a:avLst/>
+          </a:prstGeom>
+          <a:ln>
+            <a:solidFill>
+              <a:schemeClr val="tx1"/>
+            </a:solidFill>
+            <a:tailEnd type="triangle"/>
+          </a:ln>
+        </p:spPr>
+        <p:style>
+          <a:lnRef idx="1">
+            <a:schemeClr val="accent1"/>
+          </a:lnRef>
+          <a:fillRef idx="0">
+            <a:schemeClr val="accent1"/>
+          </a:fillRef>
+          <a:effectRef idx="0">
+            <a:schemeClr val="accent1"/>
+          </a:effectRef>
+          <a:fontRef idx="minor">
+            <a:schemeClr val="tx1"/>
+          </a:fontRef>
+        </p:style>
+      </p:cxnSp>
+      <p:sp>
+        <p:nvSpPr>
+          <p:cNvPr id="26" name="TextBox 25">
+            <a:extLst>
+              <a:ext uri="{FF2B5EF4-FFF2-40B4-BE49-F238E27FC236}">
+                <a16:creationId xmlns:a16="http://schemas.microsoft.com/office/drawing/2014/main" id="{8BB45836-1E83-F94D-82ED-91EEB5B48FD1}"/>
+              </a:ext>
+            </a:extLst>
+          </p:cNvPr>
+          <p:cNvSpPr txBox="1"/>
+          <p:nvPr/>
+        </p:nvSpPr>
+        <p:spPr>
+          <a:xfrm>
+            <a:off x="2891239" y="3863515"/>
+            <a:ext cx="1587596" cy="830997"/>
+          </a:xfrm>
+          <a:prstGeom prst="rect">
+            <a:avLst/>
+          </a:prstGeom>
+          <a:noFill/>
+        </p:spPr>
+        <p:txBody>
+          <a:bodyPr wrap="square" rtlCol="0">
+            <a:spAutoFit/>
+          </a:bodyPr>
+          <a:lstStyle/>
+          <a:p>
+            <a:pPr algn="ctr"/>
+            <a:r>
+              <a:rPr lang="en-US" sz="1600" dirty="0">
+                <a:solidFill>
+                  <a:srgbClr val="FF0000"/>
+                </a:solidFill>
+                <a:latin typeface="Century Schoolbook" panose="02040604050505020304" pitchFamily="18" charset="0"/>
+              </a:rPr>
+              <a:t>natural logarithm of  Bayes Factor</a:t>
+            </a:r>
+          </a:p>
+        </p:txBody>
+      </p:sp>
+      <p:cxnSp>
+        <p:nvCxnSpPr>
+          <p:cNvPr id="31" name="Straight Arrow Connector 30">
+            <a:extLst>
+              <a:ext uri="{FF2B5EF4-FFF2-40B4-BE49-F238E27FC236}">
+                <a16:creationId xmlns:a16="http://schemas.microsoft.com/office/drawing/2014/main" id="{D23553F3-0DB2-7348-8A38-403EC4BD5B1F}"/>
+              </a:ext>
+            </a:extLst>
+          </p:cNvPr>
+          <p:cNvCxnSpPr>
+            <a:cxnSpLocks/>
+          </p:cNvCxnSpPr>
+          <p:nvPr/>
+        </p:nvCxnSpPr>
+        <p:spPr>
+          <a:xfrm flipV="1">
+            <a:off x="4715715" y="4794093"/>
+            <a:ext cx="459428" cy="721509"/>
+          </a:xfrm>
+          <a:prstGeom prst="straightConnector1">
+            <a:avLst/>
+          </a:prstGeom>
+          <a:ln>
+            <a:solidFill>
+              <a:schemeClr val="tx1"/>
+            </a:solidFill>
+            <a:tailEnd type="triangle"/>
+          </a:ln>
+        </p:spPr>
+        <p:style>
+          <a:lnRef idx="1">
+            <a:schemeClr val="accent1"/>
+          </a:lnRef>
+          <a:fillRef idx="0">
+            <a:schemeClr val="accent1"/>
+          </a:fillRef>
+          <a:effectRef idx="0">
+            <a:schemeClr val="accent1"/>
+          </a:effectRef>
+          <a:fontRef idx="minor">
+            <a:schemeClr val="tx1"/>
+          </a:fontRef>
+        </p:style>
+      </p:cxnSp>
+      <p:sp>
+        <p:nvSpPr>
+          <p:cNvPr id="32" name="TextBox 31">
+            <a:extLst>
+              <a:ext uri="{FF2B5EF4-FFF2-40B4-BE49-F238E27FC236}">
+                <a16:creationId xmlns:a16="http://schemas.microsoft.com/office/drawing/2014/main" id="{BF8CADA5-A6B7-A342-B29F-26B55A707BA4}"/>
+              </a:ext>
+            </a:extLst>
+          </p:cNvPr>
+          <p:cNvSpPr txBox="1"/>
+          <p:nvPr/>
+        </p:nvSpPr>
+        <p:spPr>
+          <a:xfrm>
+            <a:off x="4894534" y="4090964"/>
+            <a:ext cx="2803973" cy="584775"/>
+          </a:xfrm>
+          <a:prstGeom prst="rect">
+            <a:avLst/>
+          </a:prstGeom>
+          <a:noFill/>
+        </p:spPr>
+        <p:txBody>
+          <a:bodyPr wrap="none" rtlCol="0">
+            <a:spAutoFit/>
+          </a:bodyPr>
+          <a:lstStyle/>
+          <a:p>
+            <a:pPr algn="ctr"/>
+            <a:r>
+              <a:rPr lang="en-US" sz="1600" dirty="0">
+                <a:solidFill>
+                  <a:schemeClr val="accent2"/>
+                </a:solidFill>
+                <a:latin typeface="Century Schoolbook" panose="02040604050505020304" pitchFamily="18" charset="0"/>
+              </a:rPr>
+              <a:t>posterior type + estimate + </a:t>
+            </a:r>
+          </a:p>
+          <a:p>
+            <a:pPr algn="ctr"/>
+            <a:r>
+              <a:rPr lang="en-US" sz="1600" dirty="0">
+                <a:solidFill>
+                  <a:schemeClr val="accent2"/>
+                </a:solidFill>
+                <a:latin typeface="Century Schoolbook" panose="02040604050505020304" pitchFamily="18" charset="0"/>
+              </a:rPr>
+              <a:t>credible intervals</a:t>
+            </a:r>
+          </a:p>
+        </p:txBody>
+      </p:sp>
+      <p:cxnSp>
+        <p:nvCxnSpPr>
+          <p:cNvPr id="33" name="Straight Arrow Connector 32">
+            <a:extLst>
+              <a:ext uri="{FF2B5EF4-FFF2-40B4-BE49-F238E27FC236}">
+                <a16:creationId xmlns:a16="http://schemas.microsoft.com/office/drawing/2014/main" id="{61829F60-9CB3-AE48-BB3B-53DD7553AB67}"/>
+              </a:ext>
+            </a:extLst>
+          </p:cNvPr>
+          <p:cNvCxnSpPr>
+            <a:cxnSpLocks/>
+          </p:cNvCxnSpPr>
+          <p:nvPr/>
+        </p:nvCxnSpPr>
+        <p:spPr>
+          <a:xfrm flipH="1" flipV="1">
+            <a:off x="5991378" y="4788156"/>
+            <a:ext cx="513244" cy="721511"/>
+          </a:xfrm>
+          <a:prstGeom prst="straightConnector1">
+            <a:avLst/>
+          </a:prstGeom>
+          <a:ln>
+            <a:solidFill>
+              <a:schemeClr val="tx1"/>
+            </a:solidFill>
+            <a:tailEnd type="triangle"/>
+          </a:ln>
+        </p:spPr>
+        <p:style>
+          <a:lnRef idx="1">
+            <a:schemeClr val="accent1"/>
+          </a:lnRef>
+          <a:fillRef idx="0">
+            <a:schemeClr val="accent1"/>
+          </a:fillRef>
+          <a:effectRef idx="0">
+            <a:schemeClr val="accent1"/>
+          </a:effectRef>
+          <a:fontRef idx="minor">
+            <a:schemeClr val="tx1"/>
+          </a:fontRef>
+        </p:style>
+      </p:cxnSp>
+      <p:cxnSp>
+        <p:nvCxnSpPr>
+          <p:cNvPr id="34" name="Straight Arrow Connector 33">
+            <a:extLst>
+              <a:ext uri="{FF2B5EF4-FFF2-40B4-BE49-F238E27FC236}">
+                <a16:creationId xmlns:a16="http://schemas.microsoft.com/office/drawing/2014/main" id="{C8D34CA4-74D1-AA47-8BFA-B0CF4CC85212}"/>
+              </a:ext>
+            </a:extLst>
+          </p:cNvPr>
+          <p:cNvCxnSpPr>
+            <a:cxnSpLocks/>
+          </p:cNvCxnSpPr>
+          <p:nvPr/>
+        </p:nvCxnSpPr>
+        <p:spPr>
+          <a:xfrm flipH="1" flipV="1">
+            <a:off x="7057903" y="4792402"/>
+            <a:ext cx="944860" cy="721510"/>
+          </a:xfrm>
+          <a:prstGeom prst="straightConnector1">
+            <a:avLst/>
+          </a:prstGeom>
+          <a:ln>
+            <a:solidFill>
+              <a:schemeClr val="tx1"/>
+            </a:solidFill>
+            <a:tailEnd type="triangle"/>
+          </a:ln>
+        </p:spPr>
+        <p:style>
+          <a:lnRef idx="1">
+            <a:schemeClr val="accent1"/>
+          </a:lnRef>
+          <a:fillRef idx="0">
+            <a:schemeClr val="accent1"/>
+          </a:fillRef>
+          <a:effectRef idx="0">
+            <a:schemeClr val="accent1"/>
+          </a:effectRef>
+          <a:fontRef idx="minor">
+            <a:schemeClr val="tx1"/>
+          </a:fontRef>
+        </p:style>
+      </p:cxnSp>
+      <p:cxnSp>
+        <p:nvCxnSpPr>
+          <p:cNvPr id="35" name="Straight Arrow Connector 34">
+            <a:extLst>
+              <a:ext uri="{FF2B5EF4-FFF2-40B4-BE49-F238E27FC236}">
+                <a16:creationId xmlns:a16="http://schemas.microsoft.com/office/drawing/2014/main" id="{1E82CFD4-9EF9-C944-B91F-4D68DC51B0D8}"/>
+              </a:ext>
+            </a:extLst>
+          </p:cNvPr>
+          <p:cNvCxnSpPr>
+            <a:cxnSpLocks/>
+          </p:cNvCxnSpPr>
+          <p:nvPr/>
+        </p:nvCxnSpPr>
+        <p:spPr>
+          <a:xfrm flipH="1" flipV="1">
+            <a:off x="10115148" y="4799667"/>
+            <a:ext cx="438988" cy="698488"/>
+          </a:xfrm>
+          <a:prstGeom prst="straightConnector1">
+            <a:avLst/>
+          </a:prstGeom>
+          <a:ln>
+            <a:solidFill>
+              <a:schemeClr val="tx1"/>
+            </a:solidFill>
+            <a:tailEnd type="triangle"/>
+          </a:ln>
+        </p:spPr>
+        <p:style>
+          <a:lnRef idx="1">
+            <a:schemeClr val="accent1"/>
+          </a:lnRef>
+          <a:fillRef idx="0">
+            <a:schemeClr val="accent1"/>
+          </a:fillRef>
+          <a:effectRef idx="0">
+            <a:schemeClr val="accent1"/>
+          </a:effectRef>
+          <a:fontRef idx="minor">
+            <a:schemeClr val="tx1"/>
+          </a:fontRef>
+        </p:style>
+      </p:cxnSp>
+      <p:sp>
+        <p:nvSpPr>
+          <p:cNvPr id="36" name="TextBox 35">
+            <a:extLst>
+              <a:ext uri="{FF2B5EF4-FFF2-40B4-BE49-F238E27FC236}">
+                <a16:creationId xmlns:a16="http://schemas.microsoft.com/office/drawing/2014/main" id="{BBC35F07-FD1B-5545-830C-3DFC6AA18694}"/>
+              </a:ext>
+            </a:extLst>
+          </p:cNvPr>
+          <p:cNvSpPr txBox="1"/>
+          <p:nvPr/>
+        </p:nvSpPr>
+        <p:spPr>
+          <a:xfrm>
+            <a:off x="8993343" y="4085320"/>
+            <a:ext cx="1537601" cy="584775"/>
+          </a:xfrm>
+          <a:prstGeom prst="rect">
+            <a:avLst/>
+          </a:prstGeom>
+          <a:noFill/>
+        </p:spPr>
+        <p:txBody>
+          <a:bodyPr wrap="none" rtlCol="0">
+            <a:spAutoFit/>
+          </a:bodyPr>
+          <a:lstStyle/>
+          <a:p>
+            <a:pPr algn="ctr"/>
+            <a:r>
+              <a:rPr lang="en-US" sz="1600" dirty="0">
+                <a:solidFill>
+                  <a:schemeClr val="accent1"/>
+                </a:solidFill>
+                <a:latin typeface="Century Schoolbook" panose="02040604050505020304" pitchFamily="18" charset="0"/>
+              </a:rPr>
+              <a:t>prior type and</a:t>
+            </a:r>
+          </a:p>
+          <a:p>
+            <a:pPr algn="ctr"/>
+            <a:r>
+              <a:rPr lang="en-US" sz="1600" dirty="0">
+                <a:solidFill>
+                  <a:schemeClr val="accent1"/>
+                </a:solidFill>
+                <a:latin typeface="Century Schoolbook" panose="02040604050505020304" pitchFamily="18" charset="0"/>
+              </a:rPr>
+              <a:t>value</a:t>
+            </a:r>
+          </a:p>
+        </p:txBody>
+      </p:sp>
+      <p:sp>
+        <p:nvSpPr>
+          <p:cNvPr id="39" name="Rectangle 38">
+            <a:extLst>
+              <a:ext uri="{FF2B5EF4-FFF2-40B4-BE49-F238E27FC236}">
+                <a16:creationId xmlns:a16="http://schemas.microsoft.com/office/drawing/2014/main" id="{227B4089-C6ED-D741-BF1B-E9EA3F602D01}"/>
+              </a:ext>
+            </a:extLst>
+          </p:cNvPr>
+          <p:cNvSpPr/>
+          <p:nvPr/>
+        </p:nvSpPr>
+        <p:spPr>
+          <a:xfrm>
+            <a:off x="529952" y="3338862"/>
+            <a:ext cx="11115040" cy="352541"/>
+          </a:xfrm>
+          <a:prstGeom prst="rect">
+            <a:avLst/>
+          </a:prstGeom>
+          <a:noFill/>
+          <a:ln>
+            <a:noFill/>
+          </a:ln>
+        </p:spPr>
+        <p:style>
+          <a:lnRef idx="2">
+            <a:schemeClr val="accent1">
+              <a:shade val="50000"/>
+            </a:schemeClr>
+          </a:lnRef>
+          <a:fillRef idx="1">
+            <a:schemeClr val="accent1"/>
+          </a:fillRef>
+          <a:effectRef idx="0">
+            <a:schemeClr val="accent1"/>
+          </a:effectRef>
+          <a:fontRef idx="minor">
+            <a:schemeClr val="lt1"/>
+          </a:fontRef>
+        </p:style>
+        <p:txBody>
+          <a:bodyPr rtlCol="0" anchor="ctr"/>
+          <a:lstStyle/>
+          <a:p>
+            <a:pPr algn="ctr"/>
+            <a:r>
+              <a:rPr lang="de-DE" sz="2000" b="1" dirty="0">
+                <a:solidFill>
+                  <a:schemeClr val="tx1"/>
+                </a:solidFill>
+                <a:latin typeface="Century Schoolbook" panose="02040604050505020304" pitchFamily="18" charset="0"/>
+              </a:rPr>
+              <a:t>Template </a:t>
+            </a:r>
+            <a:r>
+              <a:rPr lang="de-DE" sz="2000" b="1" dirty="0" err="1">
+                <a:solidFill>
+                  <a:schemeClr val="tx1"/>
+                </a:solidFill>
+                <a:latin typeface="Century Schoolbook" panose="02040604050505020304" pitchFamily="18" charset="0"/>
+              </a:rPr>
+              <a:t>for</a:t>
+            </a:r>
+            <a:r>
+              <a:rPr lang="de-DE" sz="2000" b="1" dirty="0">
+                <a:solidFill>
+                  <a:schemeClr val="tx1"/>
+                </a:solidFill>
+                <a:latin typeface="Century Schoolbook" panose="02040604050505020304" pitchFamily="18" charset="0"/>
+              </a:rPr>
+              <a:t> </a:t>
+            </a:r>
+            <a:r>
+              <a:rPr lang="de-DE" sz="2000" b="1" dirty="0" err="1">
+                <a:solidFill>
+                  <a:schemeClr val="tx1"/>
+                </a:solidFill>
+                <a:latin typeface="Century Schoolbook" panose="02040604050505020304" pitchFamily="18" charset="0"/>
+              </a:rPr>
+              <a:t>Bayesian</a:t>
+            </a:r>
+            <a:r>
+              <a:rPr lang="de-DE" sz="2000" b="1" dirty="0">
+                <a:solidFill>
+                  <a:schemeClr val="tx1"/>
+                </a:solidFill>
+                <a:latin typeface="Century Schoolbook" panose="02040604050505020304" pitchFamily="18" charset="0"/>
+              </a:rPr>
+              <a:t> </a:t>
+            </a:r>
+            <a:r>
+              <a:rPr lang="de-DE" sz="2000" b="1" dirty="0" err="1">
+                <a:solidFill>
+                  <a:schemeClr val="tx1"/>
+                </a:solidFill>
+                <a:latin typeface="Century Schoolbook" panose="02040604050505020304" pitchFamily="18" charset="0"/>
+              </a:rPr>
+              <a:t>analysis</a:t>
+            </a:r>
+            <a:endParaRPr lang="de-DE" sz="2000" b="1" dirty="0">
+              <a:solidFill>
+                <a:schemeClr val="tx1"/>
+              </a:solidFill>
+              <a:latin typeface="Century Schoolbook" panose="02040604050505020304" pitchFamily="18" charset="0"/>
+            </a:endParaRPr>
+          </a:p>
+        </p:txBody>
+      </p:sp>
+      <p:cxnSp>
+        <p:nvCxnSpPr>
+          <p:cNvPr id="45" name="Straight Arrow Connector 44">
+            <a:extLst>
+              <a:ext uri="{FF2B5EF4-FFF2-40B4-BE49-F238E27FC236}">
+                <a16:creationId xmlns:a16="http://schemas.microsoft.com/office/drawing/2014/main" id="{13E5805D-B194-DD4E-AF5B-73FE9326A009}"/>
+              </a:ext>
+            </a:extLst>
+          </p:cNvPr>
+          <p:cNvCxnSpPr>
+            <a:cxnSpLocks/>
+          </p:cNvCxnSpPr>
+          <p:nvPr/>
+        </p:nvCxnSpPr>
+        <p:spPr>
+          <a:xfrm flipV="1">
+            <a:off x="9178433" y="4788158"/>
+            <a:ext cx="459428" cy="721509"/>
+          </a:xfrm>
+          <a:prstGeom prst="straightConnector1">
+            <a:avLst/>
+          </a:prstGeom>
+          <a:ln>
+            <a:solidFill>
+              <a:schemeClr val="tx1"/>
+            </a:solidFill>
+            <a:tailEnd type="triangle"/>
+          </a:ln>
+        </p:spPr>
+        <p:style>
+          <a:lnRef idx="1">
+            <a:schemeClr val="accent1"/>
+          </a:lnRef>
+          <a:fillRef idx="0">
+            <a:schemeClr val="accent1"/>
+          </a:fillRef>
+          <a:effectRef idx="0">
+            <a:schemeClr val="accent1"/>
+          </a:effectRef>
+          <a:fontRef idx="minor">
+            <a:schemeClr val="tx1"/>
+          </a:fontRef>
+        </p:style>
+      </p:cxnSp>
     </p:spTree>
     <p:extLst>
       <p:ext uri="{BB962C8B-B14F-4D97-AF65-F5344CB8AC3E}">

</xml_diff>